<commit_message>
Update data tarikan tanggal 1 Juni 2020
</commit_message>
<xml_diff>
--- a/Visualisasi Data Menggunakan R (Coviz).pptx
+++ b/Visualisasi Data Menggunakan R (Coviz).pptx
@@ -274,7 +274,7 @@
           <a:p>
             <a:fld id="{3EA7AE15-67A5-4AA1-A796-6E160FBB311E}" type="datetimeFigureOut">
               <a:rPr lang="en-US" smtClean="0"/>
-              <a:t>5/30/2020</a:t>
+              <a:t>5/31/2020</a:t>
             </a:fld>
             <a:endParaRPr lang="en-US"/>
           </a:p>
@@ -508,7 +508,7 @@
           <a:p>
             <a:fld id="{3EA7AE15-67A5-4AA1-A796-6E160FBB311E}" type="datetimeFigureOut">
               <a:rPr lang="en-US" smtClean="0"/>
-              <a:t>5/30/2020</a:t>
+              <a:t>5/31/2020</a:t>
             </a:fld>
             <a:endParaRPr lang="en-US"/>
           </a:p>
@@ -752,7 +752,7 @@
           <a:p>
             <a:fld id="{3EA7AE15-67A5-4AA1-A796-6E160FBB311E}" type="datetimeFigureOut">
               <a:rPr lang="en-US" smtClean="0"/>
-              <a:t>5/30/2020</a:t>
+              <a:t>5/31/2020</a:t>
             </a:fld>
             <a:endParaRPr lang="en-US"/>
           </a:p>
@@ -991,7 +991,7 @@
           <a:p>
             <a:fld id="{3EA7AE15-67A5-4AA1-A796-6E160FBB311E}" type="datetimeFigureOut">
               <a:rPr lang="en-US" smtClean="0"/>
-              <a:t>5/30/2020</a:t>
+              <a:t>5/31/2020</a:t>
             </a:fld>
             <a:endParaRPr lang="en-US"/>
           </a:p>
@@ -1302,7 +1302,7 @@
           <a:p>
             <a:fld id="{3EA7AE15-67A5-4AA1-A796-6E160FBB311E}" type="datetimeFigureOut">
               <a:rPr lang="en-US" smtClean="0"/>
-              <a:t>5/30/2020</a:t>
+              <a:t>5/31/2020</a:t>
             </a:fld>
             <a:endParaRPr lang="en-US"/>
           </a:p>
@@ -1603,7 +1603,7 @@
           <a:p>
             <a:fld id="{3EA7AE15-67A5-4AA1-A796-6E160FBB311E}" type="datetimeFigureOut">
               <a:rPr lang="en-US" smtClean="0"/>
-              <a:t>5/30/2020</a:t>
+              <a:t>5/31/2020</a:t>
             </a:fld>
             <a:endParaRPr lang="en-US"/>
           </a:p>
@@ -2051,7 +2051,7 @@
           <a:p>
             <a:fld id="{3EA7AE15-67A5-4AA1-A796-6E160FBB311E}" type="datetimeFigureOut">
               <a:rPr lang="en-US" smtClean="0"/>
-              <a:t>5/30/2020</a:t>
+              <a:t>5/31/2020</a:t>
             </a:fld>
             <a:endParaRPr lang="en-US"/>
           </a:p>
@@ -2233,7 +2233,7 @@
           <a:p>
             <a:fld id="{3EA7AE15-67A5-4AA1-A796-6E160FBB311E}" type="datetimeFigureOut">
               <a:rPr lang="en-US" smtClean="0"/>
-              <a:t>5/30/2020</a:t>
+              <a:t>5/31/2020</a:t>
             </a:fld>
             <a:endParaRPr lang="en-US"/>
           </a:p>
@@ -2382,7 +2382,7 @@
           <a:p>
             <a:fld id="{3EA7AE15-67A5-4AA1-A796-6E160FBB311E}" type="datetimeFigureOut">
               <a:rPr lang="en-US" smtClean="0"/>
-              <a:t>5/30/2020</a:t>
+              <a:t>5/31/2020</a:t>
             </a:fld>
             <a:endParaRPr lang="en-US"/>
           </a:p>
@@ -2729,7 +2729,7 @@
           <a:p>
             <a:fld id="{3EA7AE15-67A5-4AA1-A796-6E160FBB311E}" type="datetimeFigureOut">
               <a:rPr lang="en-US" smtClean="0"/>
-              <a:t>5/30/2020</a:t>
+              <a:t>5/31/2020</a:t>
             </a:fld>
             <a:endParaRPr lang="en-US"/>
           </a:p>
@@ -3053,7 +3053,7 @@
           <a:p>
             <a:fld id="{3EA7AE15-67A5-4AA1-A796-6E160FBB311E}" type="datetimeFigureOut">
               <a:rPr lang="en-US" smtClean="0"/>
-              <a:t>5/30/2020</a:t>
+              <a:t>5/31/2020</a:t>
             </a:fld>
             <a:endParaRPr lang="en-US"/>
           </a:p>
@@ -3333,7 +3333,7 @@
           <a:p>
             <a:fld id="{3EA7AE15-67A5-4AA1-A796-6E160FBB311E}" type="datetimeFigureOut">
               <a:rPr lang="en-US" smtClean="0"/>
-              <a:t>5/30/2020</a:t>
+              <a:t>5/31/2020</a:t>
             </a:fld>
             <a:endParaRPr lang="en-US"/>
           </a:p>
@@ -7925,10 +7925,10 @@
       </p:pic>
       <p:pic>
         <p:nvPicPr>
-          <p:cNvPr id="3" name="Picture 2">
-            <a:extLst>
-              <a:ext uri="{FF2B5EF4-FFF2-40B4-BE49-F238E27FC236}">
-                <a16:creationId xmlns:a16="http://schemas.microsoft.com/office/drawing/2014/main" id="{DDFD9604-1A5B-4D63-9C53-AAEE4304AC6F}"/>
+          <p:cNvPr id="6" name="Picture 5">
+            <a:extLst>
+              <a:ext uri="{FF2B5EF4-FFF2-40B4-BE49-F238E27FC236}">
+                <a16:creationId xmlns:a16="http://schemas.microsoft.com/office/drawing/2014/main" id="{F65AEFB9-3965-435B-9D7B-B886982351BC}"/>
               </a:ext>
             </a:extLst>
           </p:cNvPr>
@@ -7945,8 +7945,8 @@
         </p:blipFill>
         <p:spPr>
           <a:xfrm>
-            <a:off x="4306093" y="2556195"/>
-            <a:ext cx="3583412" cy="2103120"/>
+            <a:off x="8306253" y="2532246"/>
+            <a:ext cx="3497517" cy="2103120"/>
           </a:xfrm>
           <a:prstGeom prst="rect">
             <a:avLst/>
@@ -7962,10 +7962,10 @@
       </p:pic>
       <p:pic>
         <p:nvPicPr>
-          <p:cNvPr id="6" name="Picture 5">
-            <a:extLst>
-              <a:ext uri="{FF2B5EF4-FFF2-40B4-BE49-F238E27FC236}">
-                <a16:creationId xmlns:a16="http://schemas.microsoft.com/office/drawing/2014/main" id="{F65AEFB9-3965-435B-9D7B-B886982351BC}"/>
+          <p:cNvPr id="5" name="Picture 4">
+            <a:extLst>
+              <a:ext uri="{FF2B5EF4-FFF2-40B4-BE49-F238E27FC236}">
+                <a16:creationId xmlns:a16="http://schemas.microsoft.com/office/drawing/2014/main" id="{4E440D36-610F-4D48-AAC2-2ECF8239F4EA}"/>
               </a:ext>
             </a:extLst>
           </p:cNvPr>
@@ -7982,8 +7982,8 @@
         </p:blipFill>
         <p:spPr>
           <a:xfrm>
-            <a:off x="8306253" y="2532246"/>
-            <a:ext cx="3497517" cy="2103120"/>
+            <a:off x="4359774" y="2532246"/>
+            <a:ext cx="3472451" cy="2103120"/>
           </a:xfrm>
           <a:prstGeom prst="rect">
             <a:avLst/>

</xml_diff>